<commit_message>
Updated presentation with pictures
</commit_message>
<xml_diff>
--- a/Docs/EECS395.Spring2012.SnyderOneal.InterimReport2Presentation.Instalog.pptx
+++ b/Docs/EECS395.Spring2012.SnyderOneal.InterimReport2Presentation.Instalog.pptx
@@ -4013,11 +4013,7 @@
             </a:br>
             <a:r>
               <a:rPr lang="en-US" dirty="0" smtClean="0"/>
-              <a:t>Interim Progress Report </a:t>
-            </a:r>
-            <a:r>
-              <a:rPr lang="en-US" dirty="0" smtClean="0"/>
-              <a:t>2</a:t>
+              <a:t>Interim Progress Report 2</a:t>
             </a:r>
             <a:endParaRPr lang="en-US" dirty="0"/>
           </a:p>
@@ -4069,10 +4065,6 @@
             <a:r>
               <a:rPr lang="en-US" dirty="0" smtClean="0"/>
               <a:t> </a:t>
-            </a:r>
-            <a:r>
-              <a:rPr lang="en-US" dirty="0" smtClean="0"/>
-              <a:t/>
             </a:r>
             <a:br>
               <a:rPr lang="en-US" dirty="0" smtClean="0"/>
@@ -4380,11 +4372,7 @@
             <a:pPr lvl="1"/>
             <a:r>
               <a:rPr lang="en-US" dirty="0" smtClean="0"/>
-              <a:t>Forum </a:t>
-            </a:r>
-            <a:r>
-              <a:rPr lang="en-US" dirty="0" smtClean="0"/>
-              <a:t>Experts</a:t>
+              <a:t>Forum Experts</a:t>
             </a:r>
           </a:p>
           <a:p>
@@ -4392,7 +4380,6 @@
               <a:rPr lang="en-US" dirty="0" smtClean="0"/>
               <a:t>Scope limit of just scanning features for this class</a:t>
             </a:r>
-            <a:endParaRPr lang="en-US" dirty="0" smtClean="0"/>
           </a:p>
         </p:txBody>
       </p:sp>
@@ -4493,14 +4480,12 @@
               <a:rPr lang="en-US" dirty="0" smtClean="0"/>
               <a:t>Testing and documentation</a:t>
             </a:r>
-            <a:endParaRPr lang="en-US" dirty="0" smtClean="0"/>
           </a:p>
           <a:p>
             <a:r>
               <a:rPr lang="en-US" dirty="0" smtClean="0"/>
               <a:t>Remaining work</a:t>
             </a:r>
-            <a:endParaRPr lang="en-US" dirty="0" smtClean="0"/>
           </a:p>
           <a:p>
             <a:r>
@@ -4954,10 +4939,146 @@
           <a:bodyPr/>
           <a:lstStyle/>
           <a:p>
-            <a:endParaRPr lang="en-US"/>
-          </a:p>
-        </p:txBody>
-      </p:sp>
+            <a:endParaRPr lang="en-US" dirty="0"/>
+          </a:p>
+        </p:txBody>
+      </p:sp>
+      <p:pic>
+        <p:nvPicPr>
+          <p:cNvPr id="1027" name="Picture 3"/>
+          <p:cNvPicPr>
+            <a:picLocks noChangeAspect="1" noChangeArrowheads="1"/>
+          </p:cNvPicPr>
+          <p:nvPr/>
+        </p:nvPicPr>
+        <p:blipFill>
+          <a:blip r:embed="rId2">
+            <a:extLst>
+              <a:ext uri="{28A0092B-C50C-407E-A947-70E740481C1C}">
+                <a14:useLocalDpi xmlns:a14="http://schemas.microsoft.com/office/drawing/2010/main" val="0"/>
+              </a:ext>
+            </a:extLst>
+          </a:blip>
+          <a:srcRect/>
+          <a:stretch>
+            <a:fillRect/>
+          </a:stretch>
+        </p:blipFill>
+        <p:spPr bwMode="auto">
+          <a:xfrm>
+            <a:off x="457201" y="2438400"/>
+            <a:ext cx="4038600" cy="3514709"/>
+          </a:xfrm>
+          <a:prstGeom prst="rect">
+            <a:avLst/>
+          </a:prstGeom>
+          <a:ln>
+            <a:noFill/>
+          </a:ln>
+          <a:effectLst>
+            <a:outerShdw blurRad="292100" dist="139700" dir="2700000" algn="tl" rotWithShape="0">
+              <a:srgbClr val="333333">
+                <a:alpha val="65000"/>
+              </a:srgbClr>
+            </a:outerShdw>
+          </a:effectLst>
+          <a:extLst>
+            <a:ext uri="{909E8E84-426E-40DD-AFC4-6F175D3DCCD1}">
+              <a14:hiddenFill xmlns:a14="http://schemas.microsoft.com/office/drawing/2010/main">
+                <a:solidFill>
+                  <a:schemeClr val="accent1"/>
+                </a:solidFill>
+              </a14:hiddenFill>
+            </a:ext>
+            <a:ext uri="{91240B29-F687-4F45-9708-019B960494DF}">
+              <a14:hiddenLine xmlns:a14="http://schemas.microsoft.com/office/drawing/2010/main" w="9525">
+                <a:solidFill>
+                  <a:schemeClr val="tx1"/>
+                </a:solidFill>
+                <a:miter lim="800000"/>
+                <a:headEnd/>
+                <a:tailEnd/>
+              </a14:hiddenLine>
+            </a:ext>
+            <a:ext uri="{AF507438-7753-43E0-B8FC-AC1667EBCBE1}">
+              <a14:hiddenEffects xmlns:a14="http://schemas.microsoft.com/office/drawing/2010/main">
+                <a:effectLst>
+                  <a:outerShdw dist="35921" dir="2700000" algn="ctr" rotWithShape="0">
+                    <a:schemeClr val="bg2"/>
+                  </a:outerShdw>
+                </a:effectLst>
+              </a14:hiddenEffects>
+            </a:ext>
+          </a:extLst>
+        </p:spPr>
+      </p:pic>
+      <p:pic>
+        <p:nvPicPr>
+          <p:cNvPr id="1028" name="Picture 4"/>
+          <p:cNvPicPr>
+            <a:picLocks noChangeAspect="1" noChangeArrowheads="1"/>
+          </p:cNvPicPr>
+          <p:nvPr/>
+        </p:nvPicPr>
+        <p:blipFill rotWithShape="1">
+          <a:blip r:embed="rId3">
+            <a:extLst>
+              <a:ext uri="{28A0092B-C50C-407E-A947-70E740481C1C}">
+                <a14:useLocalDpi xmlns:a14="http://schemas.microsoft.com/office/drawing/2010/main" val="0"/>
+              </a:ext>
+            </a:extLst>
+          </a:blip>
+          <a:srcRect t="6150"/>
+          <a:stretch/>
+        </p:blipFill>
+        <p:spPr bwMode="auto">
+          <a:xfrm>
+            <a:off x="4657595" y="2543311"/>
+            <a:ext cx="4029206" cy="3304886"/>
+          </a:xfrm>
+          <a:prstGeom prst="rect">
+            <a:avLst/>
+          </a:prstGeom>
+          <a:ln>
+            <a:noFill/>
+          </a:ln>
+          <a:effectLst>
+            <a:outerShdw blurRad="292100" dist="139700" dir="2700000" algn="tl" rotWithShape="0">
+              <a:srgbClr val="333333">
+                <a:alpha val="65000"/>
+              </a:srgbClr>
+            </a:outerShdw>
+          </a:effectLst>
+          <a:extLst>
+            <a:ext uri="{909E8E84-426E-40DD-AFC4-6F175D3DCCD1}">
+              <a14:hiddenFill xmlns:a14="http://schemas.microsoft.com/office/drawing/2010/main">
+                <a:solidFill>
+                  <a:schemeClr val="accent1"/>
+                </a:solidFill>
+              </a14:hiddenFill>
+            </a:ext>
+            <a:ext uri="{91240B29-F687-4F45-9708-019B960494DF}">
+              <a14:hiddenLine xmlns:a14="http://schemas.microsoft.com/office/drawing/2010/main" w="9525">
+                <a:solidFill>
+                  <a:schemeClr val="tx1"/>
+                </a:solidFill>
+                <a:miter lim="800000"/>
+                <a:headEnd/>
+                <a:tailEnd/>
+              </a14:hiddenLine>
+            </a:ext>
+            <a:ext uri="{AF507438-7753-43E0-B8FC-AC1667EBCBE1}">
+              <a14:hiddenEffects xmlns:a14="http://schemas.microsoft.com/office/drawing/2010/main">
+                <a:effectLst>
+                  <a:outerShdw dist="35921" dir="2700000" algn="ctr" rotWithShape="0">
+                    <a:schemeClr val="bg2"/>
+                  </a:outerShdw>
+                </a:effectLst>
+              </a14:hiddenEffects>
+            </a:ext>
+          </a:extLst>
+        </p:spPr>
+      </p:pic>
     </p:spTree>
     <p:extLst>
       <p:ext uri="{BB962C8B-B14F-4D97-AF65-F5344CB8AC3E}">
@@ -5331,7 +5452,6 @@
               <a:rPr lang="en-US" dirty="0" smtClean="0"/>
               <a:t>Progress made on implementation, testing can slip back due to test-driven development</a:t>
             </a:r>
-            <a:endParaRPr lang="en-US" dirty="0" smtClean="0"/>
           </a:p>
           <a:p>
             <a:endParaRPr lang="en-US" dirty="0" smtClean="0"/>

</xml_diff>

<commit_message>
Minor changes to 2nd interim presentation
</commit_message>
<xml_diff>
--- a/Docs/EECS395.Spring2012.SnyderOneal.InterimReport2Presentation.Instalog.pptx
+++ b/Docs/EECS395.Spring2012.SnyderOneal.InterimReport2Presentation.Instalog.pptx
@@ -201,7 +201,7 @@
           <a:p>
             <a:fld id="{D84E5A6C-0FE4-4FAA-ADAB-A7E1F3CC8754}" type="datetimeFigureOut">
               <a:rPr lang="en-US" smtClean="0"/>
-              <a:t>3/22/2012</a:t>
+              <a:t>3/25/2012</a:t>
             </a:fld>
             <a:endParaRPr lang="en-US"/>
           </a:p>
@@ -515,7 +515,7 @@
           <a:p>
             <a:r>
               <a:rPr lang="en-US" dirty="0" smtClean="0"/>
-              <a:t>Jacob</a:t>
+              <a:t>Bill</a:t>
             </a:r>
             <a:endParaRPr lang="en-US" dirty="0"/>
           </a:p>
@@ -603,7 +603,7 @@
           <a:p>
             <a:r>
               <a:rPr lang="en-US" dirty="0" smtClean="0"/>
-              <a:t>Jacob</a:t>
+              <a:t>Bill</a:t>
             </a:r>
             <a:endParaRPr lang="en-US" dirty="0"/>
           </a:p>
@@ -779,7 +779,11 @@
           <a:p>
             <a:r>
               <a:rPr lang="en-US" dirty="0" smtClean="0"/>
-              <a:t>Jacob</a:t>
+              <a:t>Both</a:t>
+            </a:r>
+            <a:r>
+              <a:rPr lang="en-US" baseline="0" dirty="0" smtClean="0"/>
+              <a:t> (depending on who did what)</a:t>
             </a:r>
             <a:endParaRPr lang="en-US" dirty="0"/>
           </a:p>
@@ -802,7 +806,7 @@
           <a:p>
             <a:fld id="{14332704-9C39-46D5-802E-D02DBA05A843}" type="slidenum">
               <a:rPr lang="en-US" smtClean="0"/>
-              <a:t>8</a:t>
+              <a:t>4</a:t>
             </a:fld>
             <a:endParaRPr lang="en-US"/>
           </a:p>
@@ -811,7 +815,7 @@
     </p:spTree>
     <p:extLst>
       <p:ext uri="{BB962C8B-B14F-4D97-AF65-F5344CB8AC3E}">
-        <p14:creationId xmlns:p14="http://schemas.microsoft.com/office/powerpoint/2010/main" val="651564421"/>
+        <p14:creationId xmlns:p14="http://schemas.microsoft.com/office/powerpoint/2010/main" val="1521484547"/>
       </p:ext>
     </p:extLst>
   </p:cSld>
@@ -867,9 +871,8 @@
           <a:p>
             <a:r>
               <a:rPr lang="en-US" dirty="0" smtClean="0"/>
-              <a:t>Bill</a:t>
-            </a:r>
-            <a:endParaRPr lang="en-US" dirty="0"/>
+              <a:t>Jacob</a:t>
+            </a:r>
           </a:p>
         </p:txBody>
       </p:sp>
@@ -890,7 +893,7 @@
           <a:p>
             <a:fld id="{14332704-9C39-46D5-802E-D02DBA05A843}" type="slidenum">
               <a:rPr lang="en-US" smtClean="0"/>
-              <a:t>9</a:t>
+              <a:t>6</a:t>
             </a:fld>
             <a:endParaRPr lang="en-US"/>
           </a:p>
@@ -899,7 +902,7 @@
     </p:spTree>
     <p:extLst>
       <p:ext uri="{BB962C8B-B14F-4D97-AF65-F5344CB8AC3E}">
-        <p14:creationId xmlns:p14="http://schemas.microsoft.com/office/powerpoint/2010/main" val="1467293403"/>
+        <p14:creationId xmlns:p14="http://schemas.microsoft.com/office/powerpoint/2010/main" val="2585030915"/>
       </p:ext>
     </p:extLst>
   </p:cSld>
@@ -954,10 +957,272 @@
           <a:lstStyle/>
           <a:p>
             <a:r>
-              <a:rPr lang="en-US" smtClean="0"/>
+              <a:rPr lang="en-US" dirty="0" smtClean="0"/>
               <a:t>Jacob</a:t>
             </a:r>
-            <a:endParaRPr lang="en-US"/>
+          </a:p>
+        </p:txBody>
+      </p:sp>
+      <p:sp>
+        <p:nvSpPr>
+          <p:cNvPr id="4" name="Slide Number Placeholder 3"/>
+          <p:cNvSpPr>
+            <a:spLocks noGrp="1"/>
+          </p:cNvSpPr>
+          <p:nvPr>
+            <p:ph type="sldNum" sz="quarter" idx="10"/>
+          </p:nvPr>
+        </p:nvSpPr>
+        <p:spPr/>
+        <p:txBody>
+          <a:bodyPr/>
+          <a:lstStyle/>
+          <a:p>
+            <a:fld id="{14332704-9C39-46D5-802E-D02DBA05A843}" type="slidenum">
+              <a:rPr lang="en-US" smtClean="0"/>
+              <a:t>7</a:t>
+            </a:fld>
+            <a:endParaRPr lang="en-US"/>
+          </a:p>
+        </p:txBody>
+      </p:sp>
+    </p:spTree>
+    <p:extLst>
+      <p:ext uri="{BB962C8B-B14F-4D97-AF65-F5344CB8AC3E}">
+        <p14:creationId xmlns:p14="http://schemas.microsoft.com/office/powerpoint/2010/main" val="1705490468"/>
+      </p:ext>
+    </p:extLst>
+  </p:cSld>
+  <p:clrMapOvr>
+    <a:masterClrMapping/>
+  </p:clrMapOvr>
+</p:notes>
+</file>
+
+<file path=ppt/notesSlides/notesSlide7.xml><?xml version="1.0" encoding="utf-8"?>
+<p:notes xmlns:a="http://schemas.openxmlformats.org/drawingml/2006/main" xmlns:r="http://schemas.openxmlformats.org/officeDocument/2006/relationships" xmlns:p="http://schemas.openxmlformats.org/presentationml/2006/main">
+  <p:cSld>
+    <p:spTree>
+      <p:nvGrpSpPr>
+        <p:cNvPr id="1" name=""/>
+        <p:cNvGrpSpPr/>
+        <p:nvPr/>
+      </p:nvGrpSpPr>
+      <p:grpSpPr>
+        <a:xfrm>
+          <a:off x="0" y="0"/>
+          <a:ext cx="0" cy="0"/>
+          <a:chOff x="0" y="0"/>
+          <a:chExt cx="0" cy="0"/>
+        </a:xfrm>
+      </p:grpSpPr>
+      <p:sp>
+        <p:nvSpPr>
+          <p:cNvPr id="2" name="Slide Image Placeholder 1"/>
+          <p:cNvSpPr>
+            <a:spLocks noGrp="1" noRot="1" noChangeAspect="1"/>
+          </p:cNvSpPr>
+          <p:nvPr>
+            <p:ph type="sldImg"/>
+          </p:nvPr>
+        </p:nvSpPr>
+        <p:spPr/>
+      </p:sp>
+      <p:sp>
+        <p:nvSpPr>
+          <p:cNvPr id="3" name="Notes Placeholder 2"/>
+          <p:cNvSpPr>
+            <a:spLocks noGrp="1"/>
+          </p:cNvSpPr>
+          <p:nvPr>
+            <p:ph type="body" idx="1"/>
+          </p:nvPr>
+        </p:nvSpPr>
+        <p:spPr/>
+        <p:txBody>
+          <a:bodyPr/>
+          <a:lstStyle/>
+          <a:p>
+            <a:r>
+              <a:rPr lang="en-US" dirty="0" smtClean="0"/>
+              <a:t>Jacob</a:t>
+            </a:r>
+            <a:endParaRPr lang="en-US" dirty="0"/>
+          </a:p>
+        </p:txBody>
+      </p:sp>
+      <p:sp>
+        <p:nvSpPr>
+          <p:cNvPr id="4" name="Slide Number Placeholder 3"/>
+          <p:cNvSpPr>
+            <a:spLocks noGrp="1"/>
+          </p:cNvSpPr>
+          <p:nvPr>
+            <p:ph type="sldNum" sz="quarter" idx="10"/>
+          </p:nvPr>
+        </p:nvSpPr>
+        <p:spPr/>
+        <p:txBody>
+          <a:bodyPr/>
+          <a:lstStyle/>
+          <a:p>
+            <a:fld id="{14332704-9C39-46D5-802E-D02DBA05A843}" type="slidenum">
+              <a:rPr lang="en-US" smtClean="0"/>
+              <a:t>8</a:t>
+            </a:fld>
+            <a:endParaRPr lang="en-US"/>
+          </a:p>
+        </p:txBody>
+      </p:sp>
+    </p:spTree>
+    <p:extLst>
+      <p:ext uri="{BB962C8B-B14F-4D97-AF65-F5344CB8AC3E}">
+        <p14:creationId xmlns:p14="http://schemas.microsoft.com/office/powerpoint/2010/main" val="651564421"/>
+      </p:ext>
+    </p:extLst>
+  </p:cSld>
+  <p:clrMapOvr>
+    <a:masterClrMapping/>
+  </p:clrMapOvr>
+</p:notes>
+</file>
+
+<file path=ppt/notesSlides/notesSlide8.xml><?xml version="1.0" encoding="utf-8"?>
+<p:notes xmlns:a="http://schemas.openxmlformats.org/drawingml/2006/main" xmlns:r="http://schemas.openxmlformats.org/officeDocument/2006/relationships" xmlns:p="http://schemas.openxmlformats.org/presentationml/2006/main">
+  <p:cSld>
+    <p:spTree>
+      <p:nvGrpSpPr>
+        <p:cNvPr id="1" name=""/>
+        <p:cNvGrpSpPr/>
+        <p:nvPr/>
+      </p:nvGrpSpPr>
+      <p:grpSpPr>
+        <a:xfrm>
+          <a:off x="0" y="0"/>
+          <a:ext cx="0" cy="0"/>
+          <a:chOff x="0" y="0"/>
+          <a:chExt cx="0" cy="0"/>
+        </a:xfrm>
+      </p:grpSpPr>
+      <p:sp>
+        <p:nvSpPr>
+          <p:cNvPr id="2" name="Slide Image Placeholder 1"/>
+          <p:cNvSpPr>
+            <a:spLocks noGrp="1" noRot="1" noChangeAspect="1"/>
+          </p:cNvSpPr>
+          <p:nvPr>
+            <p:ph type="sldImg"/>
+          </p:nvPr>
+        </p:nvSpPr>
+        <p:spPr/>
+      </p:sp>
+      <p:sp>
+        <p:nvSpPr>
+          <p:cNvPr id="3" name="Notes Placeholder 2"/>
+          <p:cNvSpPr>
+            <a:spLocks noGrp="1"/>
+          </p:cNvSpPr>
+          <p:nvPr>
+            <p:ph type="body" idx="1"/>
+          </p:nvPr>
+        </p:nvSpPr>
+        <p:spPr/>
+        <p:txBody>
+          <a:bodyPr/>
+          <a:lstStyle/>
+          <a:p>
+            <a:r>
+              <a:rPr lang="en-US" dirty="0" smtClean="0"/>
+              <a:t>Bill/Jacob</a:t>
+            </a:r>
+          </a:p>
+        </p:txBody>
+      </p:sp>
+      <p:sp>
+        <p:nvSpPr>
+          <p:cNvPr id="4" name="Slide Number Placeholder 3"/>
+          <p:cNvSpPr>
+            <a:spLocks noGrp="1"/>
+          </p:cNvSpPr>
+          <p:nvPr>
+            <p:ph type="sldNum" sz="quarter" idx="10"/>
+          </p:nvPr>
+        </p:nvSpPr>
+        <p:spPr/>
+        <p:txBody>
+          <a:bodyPr/>
+          <a:lstStyle/>
+          <a:p>
+            <a:fld id="{14332704-9C39-46D5-802E-D02DBA05A843}" type="slidenum">
+              <a:rPr lang="en-US" smtClean="0"/>
+              <a:t>9</a:t>
+            </a:fld>
+            <a:endParaRPr lang="en-US"/>
+          </a:p>
+        </p:txBody>
+      </p:sp>
+    </p:spTree>
+    <p:extLst>
+      <p:ext uri="{BB962C8B-B14F-4D97-AF65-F5344CB8AC3E}">
+        <p14:creationId xmlns:p14="http://schemas.microsoft.com/office/powerpoint/2010/main" val="1467293403"/>
+      </p:ext>
+    </p:extLst>
+  </p:cSld>
+  <p:clrMapOvr>
+    <a:masterClrMapping/>
+  </p:clrMapOvr>
+</p:notes>
+</file>
+
+<file path=ppt/notesSlides/notesSlide9.xml><?xml version="1.0" encoding="utf-8"?>
+<p:notes xmlns:a="http://schemas.openxmlformats.org/drawingml/2006/main" xmlns:r="http://schemas.openxmlformats.org/officeDocument/2006/relationships" xmlns:p="http://schemas.openxmlformats.org/presentationml/2006/main">
+  <p:cSld>
+    <p:spTree>
+      <p:nvGrpSpPr>
+        <p:cNvPr id="1" name=""/>
+        <p:cNvGrpSpPr/>
+        <p:nvPr/>
+      </p:nvGrpSpPr>
+      <p:grpSpPr>
+        <a:xfrm>
+          <a:off x="0" y="0"/>
+          <a:ext cx="0" cy="0"/>
+          <a:chOff x="0" y="0"/>
+          <a:chExt cx="0" cy="0"/>
+        </a:xfrm>
+      </p:grpSpPr>
+      <p:sp>
+        <p:nvSpPr>
+          <p:cNvPr id="2" name="Slide Image Placeholder 1"/>
+          <p:cNvSpPr>
+            <a:spLocks noGrp="1" noRot="1" noChangeAspect="1"/>
+          </p:cNvSpPr>
+          <p:nvPr>
+            <p:ph type="sldImg"/>
+          </p:nvPr>
+        </p:nvSpPr>
+        <p:spPr/>
+      </p:sp>
+      <p:sp>
+        <p:nvSpPr>
+          <p:cNvPr id="3" name="Notes Placeholder 2"/>
+          <p:cNvSpPr>
+            <a:spLocks noGrp="1"/>
+          </p:cNvSpPr>
+          <p:nvPr>
+            <p:ph type="body" idx="1"/>
+          </p:nvPr>
+        </p:nvSpPr>
+        <p:spPr/>
+        <p:txBody>
+          <a:bodyPr/>
+          <a:lstStyle/>
+          <a:p>
+            <a:r>
+              <a:rPr lang="en-US" dirty="0" smtClean="0"/>
+              <a:t>??????</a:t>
+            </a:r>
+            <a:endParaRPr lang="en-US" dirty="0"/>
           </a:p>
         </p:txBody>
       </p:sp>
@@ -1178,7 +1443,7 @@
           <a:p>
             <a:fld id="{7551662F-7A4A-4ABA-BF01-5B882A45EC0E}" type="datetimeFigureOut">
               <a:rPr lang="en-US" smtClean="0"/>
-              <a:t>3/22/2012</a:t>
+              <a:t>3/25/2012</a:t>
             </a:fld>
             <a:endParaRPr lang="en-US"/>
           </a:p>
@@ -1348,7 +1613,7 @@
           <a:p>
             <a:fld id="{7551662F-7A4A-4ABA-BF01-5B882A45EC0E}" type="datetimeFigureOut">
               <a:rPr lang="en-US" smtClean="0"/>
-              <a:t>3/22/2012</a:t>
+              <a:t>3/25/2012</a:t>
             </a:fld>
             <a:endParaRPr lang="en-US"/>
           </a:p>
@@ -1528,7 +1793,7 @@
           <a:p>
             <a:fld id="{7551662F-7A4A-4ABA-BF01-5B882A45EC0E}" type="datetimeFigureOut">
               <a:rPr lang="en-US" smtClean="0"/>
-              <a:t>3/22/2012</a:t>
+              <a:t>3/25/2012</a:t>
             </a:fld>
             <a:endParaRPr lang="en-US"/>
           </a:p>
@@ -1698,7 +1963,7 @@
           <a:p>
             <a:fld id="{7551662F-7A4A-4ABA-BF01-5B882A45EC0E}" type="datetimeFigureOut">
               <a:rPr lang="en-US" smtClean="0"/>
-              <a:t>3/22/2012</a:t>
+              <a:t>3/25/2012</a:t>
             </a:fld>
             <a:endParaRPr lang="en-US"/>
           </a:p>
@@ -1944,7 +2209,7 @@
           <a:p>
             <a:fld id="{7551662F-7A4A-4ABA-BF01-5B882A45EC0E}" type="datetimeFigureOut">
               <a:rPr lang="en-US" smtClean="0"/>
-              <a:t>3/22/2012</a:t>
+              <a:t>3/25/2012</a:t>
             </a:fld>
             <a:endParaRPr lang="en-US"/>
           </a:p>
@@ -2232,7 +2497,7 @@
           <a:p>
             <a:fld id="{7551662F-7A4A-4ABA-BF01-5B882A45EC0E}" type="datetimeFigureOut">
               <a:rPr lang="en-US" smtClean="0"/>
-              <a:t>3/22/2012</a:t>
+              <a:t>3/25/2012</a:t>
             </a:fld>
             <a:endParaRPr lang="en-US"/>
           </a:p>
@@ -2654,7 +2919,7 @@
           <a:p>
             <a:fld id="{7551662F-7A4A-4ABA-BF01-5B882A45EC0E}" type="datetimeFigureOut">
               <a:rPr lang="en-US" smtClean="0"/>
-              <a:t>3/22/2012</a:t>
+              <a:t>3/25/2012</a:t>
             </a:fld>
             <a:endParaRPr lang="en-US"/>
           </a:p>
@@ -2772,7 +3037,7 @@
           <a:p>
             <a:fld id="{7551662F-7A4A-4ABA-BF01-5B882A45EC0E}" type="datetimeFigureOut">
               <a:rPr lang="en-US" smtClean="0"/>
-              <a:t>3/22/2012</a:t>
+              <a:t>3/25/2012</a:t>
             </a:fld>
             <a:endParaRPr lang="en-US"/>
           </a:p>
@@ -2867,7 +3132,7 @@
           <a:p>
             <a:fld id="{7551662F-7A4A-4ABA-BF01-5B882A45EC0E}" type="datetimeFigureOut">
               <a:rPr lang="en-US" smtClean="0"/>
-              <a:t>3/22/2012</a:t>
+              <a:t>3/25/2012</a:t>
             </a:fld>
             <a:endParaRPr lang="en-US"/>
           </a:p>
@@ -3144,7 +3409,7 @@
           <a:p>
             <a:fld id="{7551662F-7A4A-4ABA-BF01-5B882A45EC0E}" type="datetimeFigureOut">
               <a:rPr lang="en-US" smtClean="0"/>
-              <a:t>3/22/2012</a:t>
+              <a:t>3/25/2012</a:t>
             </a:fld>
             <a:endParaRPr lang="en-US"/>
           </a:p>
@@ -3397,7 +3662,7 @@
           <a:p>
             <a:fld id="{7551662F-7A4A-4ABA-BF01-5B882A45EC0E}" type="datetimeFigureOut">
               <a:rPr lang="en-US" smtClean="0"/>
-              <a:t>3/22/2012</a:t>
+              <a:t>3/25/2012</a:t>
             </a:fld>
             <a:endParaRPr lang="en-US"/>
           </a:p>
@@ -3610,7 +3875,7 @@
           <a:p>
             <a:fld id="{7551662F-7A4A-4ABA-BF01-5B882A45EC0E}" type="datetimeFigureOut">
               <a:rPr lang="en-US" smtClean="0"/>
-              <a:t>3/22/2012</a:t>
+              <a:t>3/25/2012</a:t>
             </a:fld>
             <a:endParaRPr lang="en-US"/>
           </a:p>
@@ -4577,14 +4842,29 @@
         <p:spPr/>
         <p:txBody>
           <a:bodyPr>
-            <a:normAutofit fontScale="62500" lnSpcReduction="20000"/>
+            <a:normAutofit fontScale="55000" lnSpcReduction="20000"/>
           </a:bodyPr>
           <a:lstStyle/>
           <a:p>
             <a:r>
+              <a:rPr lang="en-US" dirty="0" smtClean="0"/>
+              <a:t>Learn C++ (Jacob)</a:t>
+            </a:r>
+          </a:p>
+          <a:p>
+            <a:r>
+              <a:rPr lang="en-US" dirty="0" smtClean="0"/>
+              <a:t>An </a:t>
+            </a:r>
+            <a:r>
               <a:rPr lang="en-US" dirty="0"/>
-              <a:t>An easy runtime dynamic linker</a:t>
-            </a:r>
+              <a:t>easy runtime dynamic </a:t>
+            </a:r>
+            <a:r>
+              <a:rPr lang="en-US" dirty="0" smtClean="0"/>
+              <a:t>linker (Bill)</a:t>
+            </a:r>
+            <a:endParaRPr lang="en-US" dirty="0"/>
           </a:p>
           <a:p>
             <a:r>
@@ -4593,8 +4873,13 @@
             </a:r>
             <a:r>
               <a:rPr lang="en-US" dirty="0"/>
-              <a:t>wrapper around Win32 and NT error messages to convert them to C++ exceptions</a:t>
-            </a:r>
+              <a:t>wrapper around Win32 and NT error messages to convert them to C++ </a:t>
+            </a:r>
+            <a:r>
+              <a:rPr lang="en-US" dirty="0" smtClean="0"/>
+              <a:t>exceptions (Bill)</a:t>
+            </a:r>
+            <a:endParaRPr lang="en-US" dirty="0"/>
           </a:p>
           <a:p>
             <a:r>
@@ -4603,8 +4888,13 @@
             </a:r>
             <a:r>
               <a:rPr lang="en-US" dirty="0"/>
-              <a:t>wrapper around Win32 Processes Handles</a:t>
-            </a:r>
+              <a:t>wrapper around Win32 Processes </a:t>
+            </a:r>
+            <a:r>
+              <a:rPr lang="en-US" dirty="0" smtClean="0"/>
+              <a:t>Handles (Bill)</a:t>
+            </a:r>
+            <a:endParaRPr lang="en-US" dirty="0"/>
           </a:p>
           <a:p>
             <a:r>
@@ -4613,8 +4903,13 @@
             </a:r>
             <a:r>
               <a:rPr lang="en-US" dirty="0"/>
-              <a:t>wrapper around Win32 File Handles</a:t>
-            </a:r>
+              <a:t>wrapper around Win32 File </a:t>
+            </a:r>
+            <a:r>
+              <a:rPr lang="en-US" dirty="0" smtClean="0"/>
+              <a:t>Handles (Both)</a:t>
+            </a:r>
+            <a:endParaRPr lang="en-US" dirty="0"/>
           </a:p>
           <a:p>
             <a:r>
@@ -4623,8 +4918,13 @@
             </a:r>
             <a:r>
               <a:rPr lang="en-US" dirty="0"/>
-              <a:t>privilege granting wrapper</a:t>
-            </a:r>
+              <a:t>privilege granting </a:t>
+            </a:r>
+            <a:r>
+              <a:rPr lang="en-US" dirty="0" smtClean="0"/>
+              <a:t>wrapper (Bill)</a:t>
+            </a:r>
+            <a:endParaRPr lang="en-US" dirty="0"/>
           </a:p>
           <a:p>
             <a:r>
@@ -4633,8 +4933,13 @@
             </a:r>
             <a:r>
               <a:rPr lang="en-US" dirty="0"/>
-              <a:t>manipulation functions</a:t>
-            </a:r>
+              <a:t>manipulation </a:t>
+            </a:r>
+            <a:r>
+              <a:rPr lang="en-US" dirty="0" smtClean="0"/>
+              <a:t>functions (Jacob)</a:t>
+            </a:r>
+            <a:endParaRPr lang="en-US" dirty="0"/>
           </a:p>
           <a:p>
             <a:r>
@@ -4646,9 +4951,13 @@
               <a:t>functions including escaping and </a:t>
             </a:r>
             <a:r>
-              <a:rPr lang="en-US" dirty="0" err="1"/>
+              <a:rPr lang="en-US" dirty="0" err="1" smtClean="0"/>
               <a:t>unescaping</a:t>
             </a:r>
+            <a:r>
+              <a:rPr lang="en-US" dirty="0" smtClean="0"/>
+              <a:t> (Jacob)</a:t>
+            </a:r>
             <a:endParaRPr lang="en-US" dirty="0"/>
           </a:p>
           <a:p>
@@ -4658,8 +4967,13 @@
             </a:r>
             <a:r>
               <a:rPr lang="en-US" dirty="0"/>
-              <a:t>output formats from the specification</a:t>
-            </a:r>
+              <a:t>output formats from the </a:t>
+            </a:r>
+            <a:r>
+              <a:rPr lang="en-US" dirty="0" smtClean="0"/>
+              <a:t>specification (Jacob)</a:t>
+            </a:r>
+            <a:endParaRPr lang="en-US" dirty="0"/>
           </a:p>
           <a:p>
             <a:r>
@@ -4667,9 +4981,55 @@
               <a:t>Whitelisting </a:t>
             </a:r>
             <a:r>
+              <a:rPr lang="en-US" dirty="0" smtClean="0"/>
+              <a:t>support (Both)</a:t>
+            </a:r>
+            <a:endParaRPr lang="en-US" dirty="0"/>
+          </a:p>
+          <a:p>
+            <a:r>
+              <a:rPr lang="en-US" dirty="0" smtClean="0"/>
+              <a:t>A </a:t>
+            </a:r>
+            <a:r>
               <a:rPr lang="en-US" dirty="0"/>
-              <a:t>support</a:t>
-            </a:r>
+              <a:t>wrapper around the </a:t>
+            </a:r>
+            <a:r>
+              <a:rPr lang="en-US" dirty="0" smtClean="0"/>
+              <a:t>native registry (Bill)</a:t>
+            </a:r>
+            <a:endParaRPr lang="en-US" dirty="0"/>
+          </a:p>
+          <a:p>
+            <a:r>
+              <a:rPr lang="en-US" dirty="0" smtClean="0"/>
+              <a:t>Rudimentary </a:t>
+            </a:r>
+            <a:r>
+              <a:rPr lang="en-US" dirty="0"/>
+              <a:t>scripting, reordering, and </a:t>
+            </a:r>
+            <a:r>
+              <a:rPr lang="en-US" dirty="0" smtClean="0"/>
+              <a:t>execution (Bill)</a:t>
+            </a:r>
+            <a:endParaRPr lang="en-US" dirty="0"/>
+          </a:p>
+          <a:p>
+            <a:r>
+              <a:rPr lang="en-US" dirty="0" smtClean="0"/>
+              <a:t>Common interface </a:t>
+            </a:r>
+            <a:r>
+              <a:rPr lang="en-US" dirty="0"/>
+              <a:t>for developing and reporting progress back to user </a:t>
+            </a:r>
+            <a:r>
+              <a:rPr lang="en-US" dirty="0" smtClean="0"/>
+              <a:t>interfaces (Bill)</a:t>
+            </a:r>
+            <a:endParaRPr lang="en-US" dirty="0"/>
           </a:p>
           <a:p>
             <a:r>
@@ -4678,38 +5038,13 @@
             </a:r>
             <a:r>
               <a:rPr lang="en-US" dirty="0"/>
-              <a:t>wrapper around the registry</a:t>
-            </a:r>
-          </a:p>
-          <a:p>
-            <a:r>
-              <a:rPr lang="en-US" dirty="0" smtClean="0"/>
-              <a:t>Rudimentary </a:t>
-            </a:r>
-            <a:r>
-              <a:rPr lang="en-US" dirty="0"/>
-              <a:t>scripting, reordering, and execution</a:t>
-            </a:r>
-          </a:p>
-          <a:p>
-            <a:r>
-              <a:rPr lang="en-US" dirty="0" smtClean="0"/>
-              <a:t>Framework </a:t>
-            </a:r>
-            <a:r>
-              <a:rPr lang="en-US" dirty="0"/>
-              <a:t>for developing and reporting progress back to user interfaces</a:t>
-            </a:r>
-          </a:p>
-          <a:p>
-            <a:r>
-              <a:rPr lang="en-US" dirty="0" smtClean="0"/>
-              <a:t>A </a:t>
-            </a:r>
-            <a:r>
-              <a:rPr lang="en-US" dirty="0"/>
-              <a:t>wrapper around Win32 Service Control Manager</a:t>
-            </a:r>
+              <a:t>wrapper around Win32 Service Control </a:t>
+            </a:r>
+            <a:r>
+              <a:rPr lang="en-US" dirty="0" smtClean="0"/>
+              <a:t>Manager (Jacob)</a:t>
+            </a:r>
+            <a:endParaRPr lang="en-US" dirty="0"/>
           </a:p>
         </p:txBody>
       </p:sp>
@@ -4783,13 +5118,25 @@
           <a:p>
             <a:r>
               <a:rPr lang="en-US" dirty="0" smtClean="0"/>
-              <a:t>Running Processes</a:t>
-            </a:r>
-          </a:p>
-          <a:p>
-            <a:r>
-              <a:rPr lang="en-US" dirty="0" smtClean="0"/>
-              <a:t>Services / Drivers</a:t>
+              <a:t>Headers and Footers (Bill)</a:t>
+            </a:r>
+            <a:endParaRPr lang="en-US" dirty="0" smtClean="0"/>
+          </a:p>
+          <a:p>
+            <a:r>
+              <a:rPr lang="en-US" dirty="0" smtClean="0"/>
+              <a:t>Running Processes (Both)</a:t>
+            </a:r>
+            <a:endParaRPr lang="en-US" dirty="0" smtClean="0"/>
+          </a:p>
+          <a:p>
+            <a:r>
+              <a:rPr lang="en-US" dirty="0" smtClean="0"/>
+              <a:t>Services / </a:t>
+            </a:r>
+            <a:r>
+              <a:rPr lang="en-US" dirty="0" smtClean="0"/>
+              <a:t>Drivers (Jacob)</a:t>
             </a:r>
             <a:endParaRPr lang="en-US" dirty="0"/>
           </a:p>
@@ -4952,7 +5299,7 @@
           <p:nvPr/>
         </p:nvPicPr>
         <p:blipFill>
-          <a:blip r:embed="rId2">
+          <a:blip r:embed="rId3">
             <a:extLst>
               <a:ext uri="{28A0092B-C50C-407E-A947-70E740481C1C}">
                 <a14:useLocalDpi xmlns:a14="http://schemas.microsoft.com/office/drawing/2010/main" val="0"/>
@@ -5000,15 +5347,6 @@
                 <a:tailEnd/>
               </a14:hiddenLine>
             </a:ext>
-            <a:ext uri="{AF507438-7753-43E0-B8FC-AC1667EBCBE1}">
-              <a14:hiddenEffects xmlns:a14="http://schemas.microsoft.com/office/drawing/2010/main">
-                <a:effectLst>
-                  <a:outerShdw dist="35921" dir="2700000" algn="ctr" rotWithShape="0">
-                    <a:schemeClr val="bg2"/>
-                  </a:outerShdw>
-                </a:effectLst>
-              </a14:hiddenEffects>
-            </a:ext>
           </a:extLst>
         </p:spPr>
       </p:pic>
@@ -5021,7 +5359,7 @@
           <p:nvPr/>
         </p:nvPicPr>
         <p:blipFill rotWithShape="1">
-          <a:blip r:embed="rId3">
+          <a:blip r:embed="rId4">
             <a:extLst>
               <a:ext uri="{28A0092B-C50C-407E-A947-70E740481C1C}">
                 <a14:useLocalDpi xmlns:a14="http://schemas.microsoft.com/office/drawing/2010/main" val="0"/>
@@ -5067,15 +5405,6 @@
                 <a:tailEnd/>
               </a14:hiddenLine>
             </a:ext>
-            <a:ext uri="{AF507438-7753-43E0-B8FC-AC1667EBCBE1}">
-              <a14:hiddenEffects xmlns:a14="http://schemas.microsoft.com/office/drawing/2010/main">
-                <a:effectLst>
-                  <a:outerShdw dist="35921" dir="2700000" algn="ctr" rotWithShape="0">
-                    <a:schemeClr val="bg2"/>
-                  </a:outerShdw>
-                </a:effectLst>
-              </a14:hiddenEffects>
-            </a:ext>
           </a:extLst>
         </p:spPr>
       </p:pic>
@@ -5153,12 +5482,17 @@
             </a:r>
             <a:r>
               <a:rPr lang="en-US" i="1" dirty="0" smtClean="0"/>
-              <a:t>in progress</a:t>
+              <a:t>in </a:t>
+            </a:r>
+            <a:r>
+              <a:rPr lang="en-US" i="1" dirty="0" smtClean="0"/>
+              <a:t>progress</a:t>
             </a:r>
             <a:r>
               <a:rPr lang="en-US" dirty="0" smtClean="0"/>
               <a:t>)</a:t>
             </a:r>
+            <a:endParaRPr lang="en-US" dirty="0" smtClean="0"/>
           </a:p>
           <a:p>
             <a:r>
@@ -5532,7 +5866,17 @@
           <a:p>
             <a:r>
               <a:rPr lang="en-US" dirty="0" smtClean="0"/>
-              <a:t>Proper script processing and running</a:t>
+              <a:t>Header (Version info and such)</a:t>
+            </a:r>
+          </a:p>
+          <a:p>
+            <a:r>
+              <a:rPr lang="en-US" dirty="0" smtClean="0"/>
+              <a:t>Proper </a:t>
+            </a:r>
+            <a:r>
+              <a:rPr lang="en-US" dirty="0" smtClean="0"/>
+              <a:t>script processing and running</a:t>
             </a:r>
           </a:p>
           <a:p>

</xml_diff>